<commit_message>
add spiking diagram and approximation fit slides to neuron
</commit_message>
<xml_diff>
--- a/ccn/randy_slides/oreilly_ccn_neuron.pptx
+++ b/ccn/randy_slides/oreilly_ccn_neuron.pptx
@@ -5,7 +5,7 @@
     <p:sldMasterId id="2147483648" r:id="rId1"/>
   </p:sldMasterIdLst>
   <p:notesMasterIdLst>
-    <p:notesMasterId r:id="rId41"/>
+    <p:notesMasterId r:id="rId42"/>
   </p:notesMasterIdLst>
   <p:sldIdLst>
     <p:sldId id="256" r:id="rId2"/>
@@ -43,10 +43,11 @@
     <p:sldId id="286" r:id="rId34"/>
     <p:sldId id="287" r:id="rId35"/>
     <p:sldId id="289" r:id="rId36"/>
-    <p:sldId id="288" r:id="rId37"/>
-    <p:sldId id="291" r:id="rId38"/>
-    <p:sldId id="290" r:id="rId39"/>
-    <p:sldId id="285" r:id="rId40"/>
+    <p:sldId id="295" r:id="rId37"/>
+    <p:sldId id="288" r:id="rId38"/>
+    <p:sldId id="291" r:id="rId39"/>
+    <p:sldId id="290" r:id="rId40"/>
+    <p:sldId id="285" r:id="rId41"/>
   </p:sldIdLst>
   <p:sldSz cx="10077450" cy="7562850"/>
   <p:notesSz cx="7772400" cy="10058400"/>
@@ -7417,14 +7418,19 @@
             <p:ph type="title"/>
           </p:nvPr>
         </p:nvSpPr>
-        <p:spPr/>
+        <p:spPr>
+          <a:xfrm>
+            <a:off x="503240" y="90487"/>
+            <a:ext cx="9067799" cy="660400"/>
+          </a:xfrm>
+        </p:spPr>
         <p:txBody>
           <a:bodyPr/>
           <a:lstStyle/>
           <a:p>
             <a:r>
               <a:rPr lang="en-US" dirty="0"/>
-              <a:t>Generating Output</a:t>
+              <a:t>Spiking Output</a:t>
             </a:r>
           </a:p>
         </p:txBody>
@@ -7439,11 +7445,24 @@
             <p:ph idx="1"/>
           </p:nvPr>
         </p:nvSpPr>
-        <p:spPr/>
+        <p:spPr>
+          <a:xfrm>
+            <a:off x="503240" y="5686425"/>
+            <a:ext cx="9067799" cy="1531938"/>
+          </a:xfrm>
+        </p:spPr>
         <p:txBody>
           <a:bodyPr/>
           <a:lstStyle/>
           <a:p>
+            <a:pPr>
+              <a:lnSpc>
+                <a:spcPct val="100000"/>
+              </a:lnSpc>
+              <a:spcAft>
+                <a:spcPts val="0"/>
+              </a:spcAft>
+            </a:pPr>
             <a:r>
               <a:rPr lang="en-US" dirty="0"/>
               <a:t>If </a:t>
@@ -7458,22 +7477,84 @@
             </a:r>
           </a:p>
           <a:p>
+            <a:pPr>
+              <a:lnSpc>
+                <a:spcPct val="100000"/>
+              </a:lnSpc>
+              <a:spcAft>
+                <a:spcPts val="0"/>
+              </a:spcAft>
+            </a:pPr>
             <a:r>
               <a:rPr lang="en-US" dirty="0"/>
               <a:t>Spike resets membrane potential back to rest.</a:t>
             </a:r>
           </a:p>
           <a:p>
+            <a:pPr>
+              <a:lnSpc>
+                <a:spcPct val="100000"/>
+              </a:lnSpc>
+              <a:spcAft>
+                <a:spcPts val="0"/>
+              </a:spcAft>
+            </a:pPr>
             <a:r>
               <a:rPr lang="en-US" dirty="0"/>
               <a:t>Has to climb back up to threshold to spike again</a:t>
             </a:r>
           </a:p>
           <a:p>
+            <a:pPr>
+              <a:lnSpc>
+                <a:spcPct val="100000"/>
+              </a:lnSpc>
+              <a:spcAft>
+                <a:spcPts val="0"/>
+              </a:spcAft>
+            </a:pPr>
             <a:endParaRPr lang="en-US" dirty="0"/>
           </a:p>
         </p:txBody>
       </p:sp>
+      <p:pic>
+        <p:nvPicPr>
+          <p:cNvPr id="4" name="Content Placeholder 4">
+            <a:extLst>
+              <a:ext uri="{FF2B5EF4-FFF2-40B4-BE49-F238E27FC236}">
+                <a16:creationId xmlns:a16="http://schemas.microsoft.com/office/drawing/2014/main" id="{0BF2831A-66E9-DA4F-92A7-95E151A263F2}"/>
+              </a:ext>
+            </a:extLst>
+          </p:cNvPr>
+          <p:cNvPicPr>
+            <a:picLocks noChangeAspect="1"/>
+          </p:cNvPicPr>
+          <p:nvPr/>
+        </p:nvPicPr>
+        <p:blipFill>
+          <a:blip r:embed="rId2"/>
+          <a:stretch>
+            <a:fillRect/>
+          </a:stretch>
+        </p:blipFill>
+        <p:spPr bwMode="auto">
+          <a:xfrm>
+            <a:off x="1076325" y="957007"/>
+            <a:ext cx="7802384" cy="4698072"/>
+          </a:xfrm>
+          <a:prstGeom prst="rect">
+            <a:avLst/>
+          </a:prstGeom>
+          <a:noFill/>
+          <a:ln w="9525">
+            <a:noFill/>
+            <a:round/>
+            <a:headEnd/>
+            <a:tailEnd/>
+          </a:ln>
+          <a:effectLst/>
+        </p:spPr>
+      </p:pic>
     </p:spTree>
     <p:extLst>
       <p:ext uri="{BB962C8B-B14F-4D97-AF65-F5344CB8AC3E}">
@@ -7634,7 +7715,7 @@
           <a:p>
             <a:r>
               <a:rPr lang="en-US" dirty="0"/>
-              <a:t>Sigmoidal Activation</a:t>
+              <a:t>Sigmoidal Shape: Noisy X/X+1</a:t>
             </a:r>
           </a:p>
         </p:txBody>
@@ -7764,7 +7845,13 @@
       </p:grpSpPr>
       <p:sp>
         <p:nvSpPr>
-          <p:cNvPr id="2" name="Title 1"/>
+          <p:cNvPr id="2" name="Title 1">
+            <a:extLst>
+              <a:ext uri="{FF2B5EF4-FFF2-40B4-BE49-F238E27FC236}">
+                <a16:creationId xmlns:a16="http://schemas.microsoft.com/office/drawing/2014/main" id="{545632C3-0692-DF43-AE41-BAF8C83A8B07}"/>
+              </a:ext>
+            </a:extLst>
+          </p:cNvPr>
           <p:cNvSpPr>
             <a:spLocks noGrp="1"/>
           </p:cNvSpPr>
@@ -7779,174 +7866,44 @@
           <a:p>
             <a:r>
               <a:rPr lang="en-US" dirty="0"/>
-              <a:t>Rate Code Equations</a:t>
-            </a:r>
-          </a:p>
-        </p:txBody>
-      </p:sp>
-      <p:sp>
-        <p:nvSpPr>
-          <p:cNvPr id="3" name="Content Placeholder 2"/>
-          <p:cNvSpPr>
-            <a:spLocks noGrp="1"/>
-          </p:cNvSpPr>
-          <p:nvPr>
-            <p:ph idx="1"/>
-          </p:nvPr>
-        </p:nvSpPr>
-        <p:spPr/>
-        <p:txBody>
-          <a:bodyPr/>
-          <a:lstStyle/>
-          <a:p>
-            <a:r>
-              <a:rPr lang="en-US" dirty="0"/>
-              <a:t>A little bit tricky because </a:t>
-            </a:r>
-            <a:r>
-              <a:rPr lang="en-US" dirty="0" err="1"/>
-              <a:t>Vm</a:t>
-            </a:r>
-            <a:r>
-              <a:rPr lang="en-US" dirty="0"/>
-              <a:t> doesn’t work.</a:t>
-            </a:r>
-          </a:p>
-          <a:p>
-            <a:r>
-              <a:rPr lang="en-US" dirty="0"/>
-              <a:t>Need to use excitatory conductance – threshold</a:t>
-            </a:r>
-          </a:p>
-          <a:p>
-            <a:r>
-              <a:rPr lang="en-US" dirty="0"/>
-              <a:t>XX1 equation:</a:t>
-            </a:r>
-          </a:p>
-          <a:p>
-            <a:endParaRPr lang="en-US" dirty="0"/>
-          </a:p>
-          <a:p>
-            <a:r>
-              <a:rPr lang="en-US" dirty="0" err="1"/>
-              <a:t>ge</a:t>
-            </a:r>
-            <a:r>
-              <a:rPr lang="en-US" dirty="0"/>
-              <a:t>-theta:</a:t>
-            </a:r>
-          </a:p>
-          <a:p>
-            <a:endParaRPr lang="en-US" dirty="0"/>
-          </a:p>
-          <a:p>
-            <a:r>
-              <a:rPr lang="en-US" dirty="0"/>
-              <a:t>Time </a:t>
-            </a:r>
-            <a:r>
-              <a:rPr lang="en-US"/>
-              <a:t>dyn: </a:t>
-            </a:r>
-            <a:endParaRPr lang="en-US" dirty="0"/>
+              <a:t>Noisy X/X+1 Approximates Spikes</a:t>
+            </a:r>
           </a:p>
         </p:txBody>
       </p:sp>
       <p:pic>
         <p:nvPicPr>
-          <p:cNvPr id="4" name="Picture 3" descr="Screen shot 2011-01-18 at 12.58.31 AM.png"/>
+          <p:cNvPr id="9" name="Content Placeholder 8">
+            <a:extLst>
+              <a:ext uri="{FF2B5EF4-FFF2-40B4-BE49-F238E27FC236}">
+                <a16:creationId xmlns:a16="http://schemas.microsoft.com/office/drawing/2014/main" id="{35617220-C822-AC4F-90BC-23395A639DF9}"/>
+              </a:ext>
+            </a:extLst>
+          </p:cNvPr>
           <p:cNvPicPr>
-            <a:picLocks noChangeAspect="1"/>
+            <a:picLocks noGrp="1" noChangeAspect="1"/>
           </p:cNvPicPr>
-          <p:nvPr/>
+          <p:nvPr>
+            <p:ph idx="1"/>
+          </p:nvPr>
         </p:nvPicPr>
         <p:blipFill>
-          <a:blip r:embed="rId2">
-            <a:extLst>
-              <a:ext uri="{28A0092B-C50C-407E-A947-70E740481C1C}">
-                <a14:useLocalDpi xmlns:a14="http://schemas.microsoft.com/office/drawing/2010/main" val="0"/>
-              </a:ext>
-            </a:extLst>
-          </a:blip>
+          <a:blip r:embed="rId2"/>
           <a:stretch>
             <a:fillRect/>
           </a:stretch>
         </p:blipFill>
         <p:spPr>
           <a:xfrm>
-            <a:off x="3819525" y="3019425"/>
-            <a:ext cx="2273300" cy="838200"/>
-          </a:xfrm>
-          <a:prstGeom prst="rect">
-            <a:avLst/>
-          </a:prstGeom>
-        </p:spPr>
-      </p:pic>
-      <p:pic>
-        <p:nvPicPr>
-          <p:cNvPr id="5" name="Picture 4" descr="Screen shot 2011-01-18 at 12.59.00 AM.png"/>
-          <p:cNvPicPr>
-            <a:picLocks noChangeAspect="1"/>
-          </p:cNvPicPr>
-          <p:nvPr/>
-        </p:nvPicPr>
-        <p:blipFill>
-          <a:blip r:embed="rId3">
-            <a:extLst>
-              <a:ext uri="{28A0092B-C50C-407E-A947-70E740481C1C}">
-                <a14:useLocalDpi xmlns:a14="http://schemas.microsoft.com/office/drawing/2010/main" val="0"/>
-              </a:ext>
-            </a:extLst>
-          </a:blip>
-          <a:stretch>
-            <a:fillRect/>
-          </a:stretch>
-        </p:blipFill>
-        <p:spPr>
-          <a:xfrm>
-            <a:off x="3362325" y="4238626"/>
-            <a:ext cx="3378200" cy="723900"/>
-          </a:xfrm>
-          <a:prstGeom prst="rect">
-            <a:avLst/>
-          </a:prstGeom>
-        </p:spPr>
-      </p:pic>
-      <p:pic>
-        <p:nvPicPr>
-          <p:cNvPr id="6" name="Picture 5"/>
-          <p:cNvPicPr>
-            <a:picLocks noChangeAspect="1"/>
-          </p:cNvPicPr>
-          <p:nvPr/>
-        </p:nvPicPr>
-        <p:blipFill>
-          <a:blip r:embed="rId4">
-            <a:extLst>
-              <a:ext uri="{28A0092B-C50C-407E-A947-70E740481C1C}">
-                <a14:useLocalDpi xmlns:a14="http://schemas.microsoft.com/office/drawing/2010/main" val="0"/>
-              </a:ext>
-            </a:extLst>
-          </a:blip>
-          <a:stretch>
-            <a:fillRect/>
-          </a:stretch>
-        </p:blipFill>
-        <p:spPr>
-          <a:xfrm>
-            <a:off x="3514725" y="5610225"/>
-            <a:ext cx="5791200" cy="475467"/>
-          </a:xfrm>
-          <a:prstGeom prst="rect">
-            <a:avLst/>
-          </a:prstGeom>
+            <a:off x="1699327" y="1770063"/>
+            <a:ext cx="6675622" cy="4989512"/>
+          </a:xfrm>
         </p:spPr>
       </p:pic>
     </p:spTree>
     <p:extLst>
       <p:ext uri="{BB962C8B-B14F-4D97-AF65-F5344CB8AC3E}">
-        <p14:creationId xmlns:p14="http://schemas.microsoft.com/office/powerpoint/2010/main" val="3600072711"/>
+        <p14:creationId xmlns:p14="http://schemas.microsoft.com/office/powerpoint/2010/main" val="3870241532"/>
       </p:ext>
     </p:extLst>
   </p:cSld>
@@ -7990,6 +7947,217 @@
           <a:p>
             <a:r>
               <a:rPr lang="en-US" dirty="0"/>
+              <a:t>Rate Code Equations</a:t>
+            </a:r>
+          </a:p>
+        </p:txBody>
+      </p:sp>
+      <p:sp>
+        <p:nvSpPr>
+          <p:cNvPr id="3" name="Content Placeholder 2"/>
+          <p:cNvSpPr>
+            <a:spLocks noGrp="1"/>
+          </p:cNvSpPr>
+          <p:nvPr>
+            <p:ph idx="1"/>
+          </p:nvPr>
+        </p:nvSpPr>
+        <p:spPr/>
+        <p:txBody>
+          <a:bodyPr/>
+          <a:lstStyle/>
+          <a:p>
+            <a:r>
+              <a:rPr lang="en-US" dirty="0"/>
+              <a:t>A little bit tricky because </a:t>
+            </a:r>
+            <a:r>
+              <a:rPr lang="en-US" dirty="0" err="1"/>
+              <a:t>Vm</a:t>
+            </a:r>
+            <a:r>
+              <a:rPr lang="en-US" dirty="0"/>
+              <a:t> doesn’t work.</a:t>
+            </a:r>
+          </a:p>
+          <a:p>
+            <a:r>
+              <a:rPr lang="en-US" dirty="0"/>
+              <a:t>Need to use excitatory conductance – threshold</a:t>
+            </a:r>
+          </a:p>
+          <a:p>
+            <a:r>
+              <a:rPr lang="en-US" dirty="0"/>
+              <a:t>XX1 equation:</a:t>
+            </a:r>
+          </a:p>
+          <a:p>
+            <a:endParaRPr lang="en-US" dirty="0"/>
+          </a:p>
+          <a:p>
+            <a:r>
+              <a:rPr lang="en-US" dirty="0" err="1"/>
+              <a:t>ge</a:t>
+            </a:r>
+            <a:r>
+              <a:rPr lang="en-US" dirty="0"/>
+              <a:t>-theta:</a:t>
+            </a:r>
+          </a:p>
+          <a:p>
+            <a:endParaRPr lang="en-US" dirty="0"/>
+          </a:p>
+          <a:p>
+            <a:r>
+              <a:rPr lang="en-US" dirty="0"/>
+              <a:t>Time </a:t>
+            </a:r>
+            <a:r>
+              <a:rPr lang="en-US"/>
+              <a:t>dyn: </a:t>
+            </a:r>
+            <a:endParaRPr lang="en-US" dirty="0"/>
+          </a:p>
+        </p:txBody>
+      </p:sp>
+      <p:pic>
+        <p:nvPicPr>
+          <p:cNvPr id="4" name="Picture 3" descr="Screen shot 2011-01-18 at 12.58.31 AM.png"/>
+          <p:cNvPicPr>
+            <a:picLocks noChangeAspect="1"/>
+          </p:cNvPicPr>
+          <p:nvPr/>
+        </p:nvPicPr>
+        <p:blipFill>
+          <a:blip r:embed="rId2">
+            <a:extLst>
+              <a:ext uri="{28A0092B-C50C-407E-A947-70E740481C1C}">
+                <a14:useLocalDpi xmlns:a14="http://schemas.microsoft.com/office/drawing/2010/main" val="0"/>
+              </a:ext>
+            </a:extLst>
+          </a:blip>
+          <a:stretch>
+            <a:fillRect/>
+          </a:stretch>
+        </p:blipFill>
+        <p:spPr>
+          <a:xfrm>
+            <a:off x="3819525" y="3019425"/>
+            <a:ext cx="2273300" cy="838200"/>
+          </a:xfrm>
+          <a:prstGeom prst="rect">
+            <a:avLst/>
+          </a:prstGeom>
+        </p:spPr>
+      </p:pic>
+      <p:pic>
+        <p:nvPicPr>
+          <p:cNvPr id="5" name="Picture 4" descr="Screen shot 2011-01-18 at 12.59.00 AM.png"/>
+          <p:cNvPicPr>
+            <a:picLocks noChangeAspect="1"/>
+          </p:cNvPicPr>
+          <p:nvPr/>
+        </p:nvPicPr>
+        <p:blipFill>
+          <a:blip r:embed="rId3">
+            <a:extLst>
+              <a:ext uri="{28A0092B-C50C-407E-A947-70E740481C1C}">
+                <a14:useLocalDpi xmlns:a14="http://schemas.microsoft.com/office/drawing/2010/main" val="0"/>
+              </a:ext>
+            </a:extLst>
+          </a:blip>
+          <a:stretch>
+            <a:fillRect/>
+          </a:stretch>
+        </p:blipFill>
+        <p:spPr>
+          <a:xfrm>
+            <a:off x="3362325" y="4238626"/>
+            <a:ext cx="3378200" cy="723900"/>
+          </a:xfrm>
+          <a:prstGeom prst="rect">
+            <a:avLst/>
+          </a:prstGeom>
+        </p:spPr>
+      </p:pic>
+      <p:pic>
+        <p:nvPicPr>
+          <p:cNvPr id="6" name="Picture 5"/>
+          <p:cNvPicPr>
+            <a:picLocks noChangeAspect="1"/>
+          </p:cNvPicPr>
+          <p:nvPr/>
+        </p:nvPicPr>
+        <p:blipFill>
+          <a:blip r:embed="rId4">
+            <a:extLst>
+              <a:ext uri="{28A0092B-C50C-407E-A947-70E740481C1C}">
+                <a14:useLocalDpi xmlns:a14="http://schemas.microsoft.com/office/drawing/2010/main" val="0"/>
+              </a:ext>
+            </a:extLst>
+          </a:blip>
+          <a:stretch>
+            <a:fillRect/>
+          </a:stretch>
+        </p:blipFill>
+        <p:spPr>
+          <a:xfrm>
+            <a:off x="3514725" y="5610225"/>
+            <a:ext cx="5791200" cy="475467"/>
+          </a:xfrm>
+          <a:prstGeom prst="rect">
+            <a:avLst/>
+          </a:prstGeom>
+        </p:spPr>
+      </p:pic>
+    </p:spTree>
+    <p:extLst>
+      <p:ext uri="{BB962C8B-B14F-4D97-AF65-F5344CB8AC3E}">
+        <p14:creationId xmlns:p14="http://schemas.microsoft.com/office/powerpoint/2010/main" val="3600072711"/>
+      </p:ext>
+    </p:extLst>
+  </p:cSld>
+  <p:clrMapOvr>
+    <a:masterClrMapping/>
+  </p:clrMapOvr>
+</p:sld>
+</file>
+
+<file path=ppt/slides/slide38.xml><?xml version="1.0" encoding="utf-8"?>
+<p:sld xmlns:a="http://schemas.openxmlformats.org/drawingml/2006/main" xmlns:r="http://schemas.openxmlformats.org/officeDocument/2006/relationships" xmlns:p="http://schemas.openxmlformats.org/presentationml/2006/main">
+  <p:cSld>
+    <p:spTree>
+      <p:nvGrpSpPr>
+        <p:cNvPr id="1" name=""/>
+        <p:cNvGrpSpPr/>
+        <p:nvPr/>
+      </p:nvGrpSpPr>
+      <p:grpSpPr>
+        <a:xfrm>
+          <a:off x="0" y="0"/>
+          <a:ext cx="0" cy="0"/>
+          <a:chOff x="0" y="0"/>
+          <a:chExt cx="0" cy="0"/>
+        </a:xfrm>
+      </p:grpSpPr>
+      <p:sp>
+        <p:nvSpPr>
+          <p:cNvPr id="2" name="Title 1"/>
+          <p:cNvSpPr>
+            <a:spLocks noGrp="1"/>
+          </p:cNvSpPr>
+          <p:nvPr>
+            <p:ph type="title"/>
+          </p:nvPr>
+        </p:nvSpPr>
+        <p:spPr/>
+        <p:txBody>
+          <a:bodyPr/>
+          <a:lstStyle/>
+          <a:p>
+            <a:r>
+              <a:rPr lang="en-US" dirty="0"/>
               <a:t>The Synapse</a:t>
             </a:r>
           </a:p>
@@ -8038,7 +8206,7 @@
             <a:fld id="{5689AE7F-56EB-8D49-9914-836A4F709789}" type="slidenum">
               <a:rPr lang="en-US" smtClean="0"/>
               <a:pPr/>
-              <a:t>37</a:t>
+              <a:t>38</a:t>
             </a:fld>
             <a:endParaRPr lang="en-US"/>
           </a:p>
@@ -8057,7 +8225,7 @@
 </p:sld>
 </file>
 
-<file path=ppt/slides/slide38.xml><?xml version="1.0" encoding="utf-8"?>
+<file path=ppt/slides/slide39.xml><?xml version="1.0" encoding="utf-8"?>
 <p:sld xmlns:a="http://schemas.openxmlformats.org/drawingml/2006/main" xmlns:r="http://schemas.openxmlformats.org/officeDocument/2006/relationships" xmlns:p="http://schemas.openxmlformats.org/presentationml/2006/main">
   <p:cSld>
     <p:spTree>
@@ -8134,7 +8302,91 @@
 </p:sld>
 </file>
 
-<file path=ppt/slides/slide39.xml><?xml version="1.0" encoding="utf-8"?>
+<file path=ppt/slides/slide4.xml><?xml version="1.0" encoding="utf-8"?>
+<p:sld xmlns:a="http://schemas.openxmlformats.org/drawingml/2006/main" xmlns:r="http://schemas.openxmlformats.org/officeDocument/2006/relationships" xmlns:p="http://schemas.openxmlformats.org/presentationml/2006/main">
+  <p:cSld>
+    <p:spTree>
+      <p:nvGrpSpPr>
+        <p:cNvPr id="1" name=""/>
+        <p:cNvGrpSpPr/>
+        <p:nvPr/>
+      </p:nvGrpSpPr>
+      <p:grpSpPr>
+        <a:xfrm>
+          <a:off x="0" y="0"/>
+          <a:ext cx="0" cy="0"/>
+          <a:chOff x="0" y="0"/>
+          <a:chExt cx="0" cy="0"/>
+        </a:xfrm>
+      </p:grpSpPr>
+      <p:sp>
+        <p:nvSpPr>
+          <p:cNvPr id="2" name="Title 1"/>
+          <p:cNvSpPr>
+            <a:spLocks noGrp="1"/>
+          </p:cNvSpPr>
+          <p:nvPr>
+            <p:ph type="title"/>
+          </p:nvPr>
+        </p:nvSpPr>
+        <p:spPr/>
+        <p:txBody>
+          <a:bodyPr/>
+          <a:lstStyle/>
+          <a:p>
+            <a:r>
+              <a:rPr lang="en-US" dirty="0"/>
+              <a:t>Pandemonium!</a:t>
+            </a:r>
+            <a:br>
+              <a:rPr lang="en-US" dirty="0"/>
+            </a:br>
+            <a:r>
+              <a:rPr lang="en-US" sz="2800" dirty="0"/>
+              <a:t>(Oliver Selfridge)</a:t>
+            </a:r>
+          </a:p>
+        </p:txBody>
+      </p:sp>
+      <p:pic>
+        <p:nvPicPr>
+          <p:cNvPr id="4" name="Content Placeholder 3" descr="fig_pandemonium_selfridge.png"/>
+          <p:cNvPicPr>
+            <a:picLocks noGrp="1" noChangeAspect="1"/>
+          </p:cNvPicPr>
+          <p:nvPr>
+            <p:ph idx="1"/>
+          </p:nvPr>
+        </p:nvPicPr>
+        <p:blipFill>
+          <a:blip r:embed="rId2">
+            <a:extLst>
+              <a:ext uri="{28A0092B-C50C-407E-A947-70E740481C1C}">
+                <a14:useLocalDpi xmlns:a14="http://schemas.microsoft.com/office/drawing/2010/main" val="0"/>
+              </a:ext>
+            </a:extLst>
+          </a:blip>
+          <a:srcRect t="1089" b="1089"/>
+          <a:stretch>
+            <a:fillRect/>
+          </a:stretch>
+        </p:blipFill>
+        <p:spPr/>
+      </p:pic>
+    </p:spTree>
+    <p:extLst>
+      <p:ext uri="{BB962C8B-B14F-4D97-AF65-F5344CB8AC3E}">
+        <p14:creationId xmlns:p14="http://schemas.microsoft.com/office/powerpoint/2010/main" val="1499894093"/>
+      </p:ext>
+    </p:extLst>
+  </p:cSld>
+  <p:clrMapOvr>
+    <a:masterClrMapping/>
+  </p:clrMapOvr>
+</p:sld>
+</file>
+
+<file path=ppt/slides/slide40.xml><?xml version="1.0" encoding="utf-8"?>
 <p:sld xmlns:a="http://schemas.openxmlformats.org/drawingml/2006/main" xmlns:r="http://schemas.openxmlformats.org/officeDocument/2006/relationships" xmlns:p="http://schemas.openxmlformats.org/presentationml/2006/main">
   <p:cSld>
     <p:spTree>
@@ -8314,90 +8566,6 @@
     <p:extLst>
       <p:ext uri="{BB962C8B-B14F-4D97-AF65-F5344CB8AC3E}">
         <p14:creationId xmlns:p14="http://schemas.microsoft.com/office/powerpoint/2010/main" val="2259824562"/>
-      </p:ext>
-    </p:extLst>
-  </p:cSld>
-  <p:clrMapOvr>
-    <a:masterClrMapping/>
-  </p:clrMapOvr>
-</p:sld>
-</file>
-
-<file path=ppt/slides/slide4.xml><?xml version="1.0" encoding="utf-8"?>
-<p:sld xmlns:a="http://schemas.openxmlformats.org/drawingml/2006/main" xmlns:r="http://schemas.openxmlformats.org/officeDocument/2006/relationships" xmlns:p="http://schemas.openxmlformats.org/presentationml/2006/main">
-  <p:cSld>
-    <p:spTree>
-      <p:nvGrpSpPr>
-        <p:cNvPr id="1" name=""/>
-        <p:cNvGrpSpPr/>
-        <p:nvPr/>
-      </p:nvGrpSpPr>
-      <p:grpSpPr>
-        <a:xfrm>
-          <a:off x="0" y="0"/>
-          <a:ext cx="0" cy="0"/>
-          <a:chOff x="0" y="0"/>
-          <a:chExt cx="0" cy="0"/>
-        </a:xfrm>
-      </p:grpSpPr>
-      <p:sp>
-        <p:nvSpPr>
-          <p:cNvPr id="2" name="Title 1"/>
-          <p:cNvSpPr>
-            <a:spLocks noGrp="1"/>
-          </p:cNvSpPr>
-          <p:nvPr>
-            <p:ph type="title"/>
-          </p:nvPr>
-        </p:nvSpPr>
-        <p:spPr/>
-        <p:txBody>
-          <a:bodyPr/>
-          <a:lstStyle/>
-          <a:p>
-            <a:r>
-              <a:rPr lang="en-US" dirty="0"/>
-              <a:t>Pandemonium!</a:t>
-            </a:r>
-            <a:br>
-              <a:rPr lang="en-US" dirty="0"/>
-            </a:br>
-            <a:r>
-              <a:rPr lang="en-US" sz="2800" dirty="0"/>
-              <a:t>(Oliver Selfridge)</a:t>
-            </a:r>
-          </a:p>
-        </p:txBody>
-      </p:sp>
-      <p:pic>
-        <p:nvPicPr>
-          <p:cNvPr id="4" name="Content Placeholder 3" descr="fig_pandemonium_selfridge.png"/>
-          <p:cNvPicPr>
-            <a:picLocks noGrp="1" noChangeAspect="1"/>
-          </p:cNvPicPr>
-          <p:nvPr>
-            <p:ph idx="1"/>
-          </p:nvPr>
-        </p:nvPicPr>
-        <p:blipFill>
-          <a:blip r:embed="rId2">
-            <a:extLst>
-              <a:ext uri="{28A0092B-C50C-407E-A947-70E740481C1C}">
-                <a14:useLocalDpi xmlns:a14="http://schemas.microsoft.com/office/drawing/2010/main" val="0"/>
-              </a:ext>
-            </a:extLst>
-          </a:blip>
-          <a:srcRect t="1089" b="1089"/>
-          <a:stretch>
-            <a:fillRect/>
-          </a:stretch>
-        </p:blipFill>
-        <p:spPr/>
-      </p:pic>
-    </p:spTree>
-    <p:extLst>
-      <p:ext uri="{BB962C8B-B14F-4D97-AF65-F5344CB8AC3E}">
-        <p14:creationId xmlns:p14="http://schemas.microsoft.com/office/powerpoint/2010/main" val="1499894093"/>
       </p:ext>
     </p:extLst>
   </p:cSld>

</xml_diff>